<commit_message>
Update workflow picture - (Task #483)
</commit_message>
<xml_diff>
--- a/de.dlr.sc.virsat.docs.feature/src/docs/images/chapterSettingUpInfrastructure/Workflow.pptx
+++ b/de.dlr.sc.virsat.docs.feature/src/docs/images/chapterSettingUpInfrastructure/Workflow.pptx
@@ -288,9 +288,9 @@
           <a:p>
             <a:fld id="{01AF14BA-EA8B-4617-AE08-AF4065D54D9C}" type="datetimeFigureOut">
               <a:rPr lang="de-DE" smtClean="0"/>
-              <a:t>11.07.2019</a:t>
+              <a:t>19.02.2020</a:t>
             </a:fld>
-            <a:endParaRPr lang="de-DE"/>
+            <a:endParaRPr lang="de-DE" dirty="0"/>
           </a:p>
         </p:txBody>
       </p:sp>
@@ -309,7 +309,7 @@
           <a:bodyPr/>
           <a:lstStyle/>
           <a:p>
-            <a:endParaRPr lang="de-DE"/>
+            <a:endParaRPr lang="de-DE" dirty="0"/>
           </a:p>
         </p:txBody>
       </p:sp>
@@ -330,9 +330,9 @@
           <a:p>
             <a:fld id="{8F55B5BC-D97B-43C8-BF6F-951F373C75AC}" type="slidenum">
               <a:rPr lang="de-DE" smtClean="0"/>
-              <a:t>‹Nr.›</a:t>
+              <a:t>‹#›</a:t>
             </a:fld>
-            <a:endParaRPr lang="de-DE"/>
+            <a:endParaRPr lang="de-DE" dirty="0"/>
           </a:p>
         </p:txBody>
       </p:sp>
@@ -458,9 +458,9 @@
           <a:p>
             <a:fld id="{01AF14BA-EA8B-4617-AE08-AF4065D54D9C}" type="datetimeFigureOut">
               <a:rPr lang="de-DE" smtClean="0"/>
-              <a:t>11.07.2019</a:t>
+              <a:t>19.02.2020</a:t>
             </a:fld>
-            <a:endParaRPr lang="de-DE"/>
+            <a:endParaRPr lang="de-DE" dirty="0"/>
           </a:p>
         </p:txBody>
       </p:sp>
@@ -479,7 +479,7 @@
           <a:bodyPr/>
           <a:lstStyle/>
           <a:p>
-            <a:endParaRPr lang="de-DE"/>
+            <a:endParaRPr lang="de-DE" dirty="0"/>
           </a:p>
         </p:txBody>
       </p:sp>
@@ -500,9 +500,9 @@
           <a:p>
             <a:fld id="{8F55B5BC-D97B-43C8-BF6F-951F373C75AC}" type="slidenum">
               <a:rPr lang="de-DE" smtClean="0"/>
-              <a:t>‹Nr.›</a:t>
+              <a:t>‹#›</a:t>
             </a:fld>
-            <a:endParaRPr lang="de-DE"/>
+            <a:endParaRPr lang="de-DE" dirty="0"/>
           </a:p>
         </p:txBody>
       </p:sp>
@@ -638,9 +638,9 @@
           <a:p>
             <a:fld id="{01AF14BA-EA8B-4617-AE08-AF4065D54D9C}" type="datetimeFigureOut">
               <a:rPr lang="de-DE" smtClean="0"/>
-              <a:t>11.07.2019</a:t>
+              <a:t>19.02.2020</a:t>
             </a:fld>
-            <a:endParaRPr lang="de-DE"/>
+            <a:endParaRPr lang="de-DE" dirty="0"/>
           </a:p>
         </p:txBody>
       </p:sp>
@@ -659,7 +659,7 @@
           <a:bodyPr/>
           <a:lstStyle/>
           <a:p>
-            <a:endParaRPr lang="de-DE"/>
+            <a:endParaRPr lang="de-DE" dirty="0"/>
           </a:p>
         </p:txBody>
       </p:sp>
@@ -680,9 +680,9 @@
           <a:p>
             <a:fld id="{8F55B5BC-D97B-43C8-BF6F-951F373C75AC}" type="slidenum">
               <a:rPr lang="de-DE" smtClean="0"/>
-              <a:t>‹Nr.›</a:t>
+              <a:t>‹#›</a:t>
             </a:fld>
-            <a:endParaRPr lang="de-DE"/>
+            <a:endParaRPr lang="de-DE" dirty="0"/>
           </a:p>
         </p:txBody>
       </p:sp>
@@ -808,9 +808,9 @@
           <a:p>
             <a:fld id="{01AF14BA-EA8B-4617-AE08-AF4065D54D9C}" type="datetimeFigureOut">
               <a:rPr lang="de-DE" smtClean="0"/>
-              <a:t>11.07.2019</a:t>
+              <a:t>19.02.2020</a:t>
             </a:fld>
-            <a:endParaRPr lang="de-DE"/>
+            <a:endParaRPr lang="de-DE" dirty="0"/>
           </a:p>
         </p:txBody>
       </p:sp>
@@ -829,7 +829,7 @@
           <a:bodyPr/>
           <a:lstStyle/>
           <a:p>
-            <a:endParaRPr lang="de-DE"/>
+            <a:endParaRPr lang="de-DE" dirty="0"/>
           </a:p>
         </p:txBody>
       </p:sp>
@@ -850,9 +850,9 @@
           <a:p>
             <a:fld id="{8F55B5BC-D97B-43C8-BF6F-951F373C75AC}" type="slidenum">
               <a:rPr lang="de-DE" smtClean="0"/>
-              <a:t>‹Nr.›</a:t>
+              <a:t>‹#›</a:t>
             </a:fld>
-            <a:endParaRPr lang="de-DE"/>
+            <a:endParaRPr lang="de-DE" dirty="0"/>
           </a:p>
         </p:txBody>
       </p:sp>
@@ -1054,9 +1054,9 @@
           <a:p>
             <a:fld id="{01AF14BA-EA8B-4617-AE08-AF4065D54D9C}" type="datetimeFigureOut">
               <a:rPr lang="de-DE" smtClean="0"/>
-              <a:t>11.07.2019</a:t>
+              <a:t>19.02.2020</a:t>
             </a:fld>
-            <a:endParaRPr lang="de-DE"/>
+            <a:endParaRPr lang="de-DE" dirty="0"/>
           </a:p>
         </p:txBody>
       </p:sp>
@@ -1075,7 +1075,7 @@
           <a:bodyPr/>
           <a:lstStyle/>
           <a:p>
-            <a:endParaRPr lang="de-DE"/>
+            <a:endParaRPr lang="de-DE" dirty="0"/>
           </a:p>
         </p:txBody>
       </p:sp>
@@ -1096,9 +1096,9 @@
           <a:p>
             <a:fld id="{8F55B5BC-D97B-43C8-BF6F-951F373C75AC}" type="slidenum">
               <a:rPr lang="de-DE" smtClean="0"/>
-              <a:t>‹Nr.›</a:t>
+              <a:t>‹#›</a:t>
             </a:fld>
-            <a:endParaRPr lang="de-DE"/>
+            <a:endParaRPr lang="de-DE" dirty="0"/>
           </a:p>
         </p:txBody>
       </p:sp>
@@ -1342,9 +1342,9 @@
           <a:p>
             <a:fld id="{01AF14BA-EA8B-4617-AE08-AF4065D54D9C}" type="datetimeFigureOut">
               <a:rPr lang="de-DE" smtClean="0"/>
-              <a:t>11.07.2019</a:t>
+              <a:t>19.02.2020</a:t>
             </a:fld>
-            <a:endParaRPr lang="de-DE"/>
+            <a:endParaRPr lang="de-DE" dirty="0"/>
           </a:p>
         </p:txBody>
       </p:sp>
@@ -1363,7 +1363,7 @@
           <a:bodyPr/>
           <a:lstStyle/>
           <a:p>
-            <a:endParaRPr lang="de-DE"/>
+            <a:endParaRPr lang="de-DE" dirty="0"/>
           </a:p>
         </p:txBody>
       </p:sp>
@@ -1384,9 +1384,9 @@
           <a:p>
             <a:fld id="{8F55B5BC-D97B-43C8-BF6F-951F373C75AC}" type="slidenum">
               <a:rPr lang="de-DE" smtClean="0"/>
-              <a:t>‹Nr.›</a:t>
+              <a:t>‹#›</a:t>
             </a:fld>
-            <a:endParaRPr lang="de-DE"/>
+            <a:endParaRPr lang="de-DE" dirty="0"/>
           </a:p>
         </p:txBody>
       </p:sp>
@@ -1764,9 +1764,9 @@
           <a:p>
             <a:fld id="{01AF14BA-EA8B-4617-AE08-AF4065D54D9C}" type="datetimeFigureOut">
               <a:rPr lang="de-DE" smtClean="0"/>
-              <a:t>11.07.2019</a:t>
+              <a:t>19.02.2020</a:t>
             </a:fld>
-            <a:endParaRPr lang="de-DE"/>
+            <a:endParaRPr lang="de-DE" dirty="0"/>
           </a:p>
         </p:txBody>
       </p:sp>
@@ -1785,7 +1785,7 @@
           <a:bodyPr/>
           <a:lstStyle/>
           <a:p>
-            <a:endParaRPr lang="de-DE"/>
+            <a:endParaRPr lang="de-DE" dirty="0"/>
           </a:p>
         </p:txBody>
       </p:sp>
@@ -1806,9 +1806,9 @@
           <a:p>
             <a:fld id="{8F55B5BC-D97B-43C8-BF6F-951F373C75AC}" type="slidenum">
               <a:rPr lang="de-DE" smtClean="0"/>
-              <a:t>‹Nr.›</a:t>
+              <a:t>‹#›</a:t>
             </a:fld>
-            <a:endParaRPr lang="de-DE"/>
+            <a:endParaRPr lang="de-DE" dirty="0"/>
           </a:p>
         </p:txBody>
       </p:sp>
@@ -1882,9 +1882,9 @@
           <a:p>
             <a:fld id="{01AF14BA-EA8B-4617-AE08-AF4065D54D9C}" type="datetimeFigureOut">
               <a:rPr lang="de-DE" smtClean="0"/>
-              <a:t>11.07.2019</a:t>
+              <a:t>19.02.2020</a:t>
             </a:fld>
-            <a:endParaRPr lang="de-DE"/>
+            <a:endParaRPr lang="de-DE" dirty="0"/>
           </a:p>
         </p:txBody>
       </p:sp>
@@ -1903,7 +1903,7 @@
           <a:bodyPr/>
           <a:lstStyle/>
           <a:p>
-            <a:endParaRPr lang="de-DE"/>
+            <a:endParaRPr lang="de-DE" dirty="0"/>
           </a:p>
         </p:txBody>
       </p:sp>
@@ -1924,9 +1924,9 @@
           <a:p>
             <a:fld id="{8F55B5BC-D97B-43C8-BF6F-951F373C75AC}" type="slidenum">
               <a:rPr lang="de-DE" smtClean="0"/>
-              <a:t>‹Nr.›</a:t>
+              <a:t>‹#›</a:t>
             </a:fld>
-            <a:endParaRPr lang="de-DE"/>
+            <a:endParaRPr lang="de-DE" dirty="0"/>
           </a:p>
         </p:txBody>
       </p:sp>
@@ -1977,9 +1977,9 @@
           <a:p>
             <a:fld id="{01AF14BA-EA8B-4617-AE08-AF4065D54D9C}" type="datetimeFigureOut">
               <a:rPr lang="de-DE" smtClean="0"/>
-              <a:t>11.07.2019</a:t>
+              <a:t>19.02.2020</a:t>
             </a:fld>
-            <a:endParaRPr lang="de-DE"/>
+            <a:endParaRPr lang="de-DE" dirty="0"/>
           </a:p>
         </p:txBody>
       </p:sp>
@@ -1998,7 +1998,7 @@
           <a:bodyPr/>
           <a:lstStyle/>
           <a:p>
-            <a:endParaRPr lang="de-DE"/>
+            <a:endParaRPr lang="de-DE" dirty="0"/>
           </a:p>
         </p:txBody>
       </p:sp>
@@ -2019,9 +2019,9 @@
           <a:p>
             <a:fld id="{8F55B5BC-D97B-43C8-BF6F-951F373C75AC}" type="slidenum">
               <a:rPr lang="de-DE" smtClean="0"/>
-              <a:t>‹Nr.›</a:t>
+              <a:t>‹#›</a:t>
             </a:fld>
-            <a:endParaRPr lang="de-DE"/>
+            <a:endParaRPr lang="de-DE" dirty="0"/>
           </a:p>
         </p:txBody>
       </p:sp>
@@ -2254,9 +2254,9 @@
           <a:p>
             <a:fld id="{01AF14BA-EA8B-4617-AE08-AF4065D54D9C}" type="datetimeFigureOut">
               <a:rPr lang="de-DE" smtClean="0"/>
-              <a:t>11.07.2019</a:t>
+              <a:t>19.02.2020</a:t>
             </a:fld>
-            <a:endParaRPr lang="de-DE"/>
+            <a:endParaRPr lang="de-DE" dirty="0"/>
           </a:p>
         </p:txBody>
       </p:sp>
@@ -2275,7 +2275,7 @@
           <a:bodyPr/>
           <a:lstStyle/>
           <a:p>
-            <a:endParaRPr lang="de-DE"/>
+            <a:endParaRPr lang="de-DE" dirty="0"/>
           </a:p>
         </p:txBody>
       </p:sp>
@@ -2296,9 +2296,9 @@
           <a:p>
             <a:fld id="{8F55B5BC-D97B-43C8-BF6F-951F373C75AC}" type="slidenum">
               <a:rPr lang="de-DE" smtClean="0"/>
-              <a:t>‹Nr.›</a:t>
+              <a:t>‹#›</a:t>
             </a:fld>
-            <a:endParaRPr lang="de-DE"/>
+            <a:endParaRPr lang="de-DE" dirty="0"/>
           </a:p>
         </p:txBody>
       </p:sp>
@@ -2421,7 +2421,7 @@
             </a:lvl9pPr>
           </a:lstStyle>
           <a:p>
-            <a:endParaRPr lang="de-DE"/>
+            <a:endParaRPr lang="de-DE" dirty="0"/>
           </a:p>
         </p:txBody>
       </p:sp>
@@ -2507,9 +2507,9 @@
           <a:p>
             <a:fld id="{01AF14BA-EA8B-4617-AE08-AF4065D54D9C}" type="datetimeFigureOut">
               <a:rPr lang="de-DE" smtClean="0"/>
-              <a:t>11.07.2019</a:t>
+              <a:t>19.02.2020</a:t>
             </a:fld>
-            <a:endParaRPr lang="de-DE"/>
+            <a:endParaRPr lang="de-DE" dirty="0"/>
           </a:p>
         </p:txBody>
       </p:sp>
@@ -2528,7 +2528,7 @@
           <a:bodyPr/>
           <a:lstStyle/>
           <a:p>
-            <a:endParaRPr lang="de-DE"/>
+            <a:endParaRPr lang="de-DE" dirty="0"/>
           </a:p>
         </p:txBody>
       </p:sp>
@@ -2549,9 +2549,9 @@
           <a:p>
             <a:fld id="{8F55B5BC-D97B-43C8-BF6F-951F373C75AC}" type="slidenum">
               <a:rPr lang="de-DE" smtClean="0"/>
-              <a:t>‹Nr.›</a:t>
+              <a:t>‹#›</a:t>
             </a:fld>
-            <a:endParaRPr lang="de-DE"/>
+            <a:endParaRPr lang="de-DE" dirty="0"/>
           </a:p>
         </p:txBody>
       </p:sp>
@@ -2720,9 +2720,9 @@
           <a:p>
             <a:fld id="{01AF14BA-EA8B-4617-AE08-AF4065D54D9C}" type="datetimeFigureOut">
               <a:rPr lang="de-DE" smtClean="0"/>
-              <a:t>11.07.2019</a:t>
+              <a:t>19.02.2020</a:t>
             </a:fld>
-            <a:endParaRPr lang="de-DE"/>
+            <a:endParaRPr lang="de-DE" dirty="0"/>
           </a:p>
         </p:txBody>
       </p:sp>
@@ -2759,7 +2759,7 @@
             </a:lvl1pPr>
           </a:lstStyle>
           <a:p>
-            <a:endParaRPr lang="de-DE"/>
+            <a:endParaRPr lang="de-DE" dirty="0"/>
           </a:p>
         </p:txBody>
       </p:sp>
@@ -2798,9 +2798,9 @@
           <a:p>
             <a:fld id="{8F55B5BC-D97B-43C8-BF6F-951F373C75AC}" type="slidenum">
               <a:rPr lang="de-DE" smtClean="0"/>
-              <a:t>‹Nr.›</a:t>
+              <a:t>‹#›</a:t>
             </a:fld>
-            <a:endParaRPr lang="de-DE"/>
+            <a:endParaRPr lang="de-DE" dirty="0"/>
           </a:p>
         </p:txBody>
       </p:sp>
@@ -3138,7 +3138,11 @@
             <a:pPr algn="ctr"/>
             <a:r>
               <a:rPr lang="en-US" dirty="0" smtClean="0"/>
-              <a:t>(SVN)</a:t>
+              <a:t>(Git/SVN</a:t>
+            </a:r>
+            <a:r>
+              <a:rPr lang="en-US" dirty="0" smtClean="0"/>
+              <a:t>)</a:t>
             </a:r>
             <a:endParaRPr lang="de-DE" dirty="0"/>
           </a:p>
@@ -3650,7 +3654,7 @@
           <a:lstStyle/>
           <a:p>
             <a:pPr algn="ctr"/>
-            <a:endParaRPr lang="de-DE">
+            <a:endParaRPr lang="de-DE" dirty="0">
               <a:solidFill>
                 <a:schemeClr val="tx1"/>
               </a:solidFill>

</xml_diff>